<commit_message>
Update the read mapper graph to 2015.  Also include SAM/BAM spec with supplementary flag.
</commit_message>
<xml_diff>
--- a/LectureFiles/cshl/2015/RNASeq_Module2_Lecture.pptx
+++ b/LectureFiles/cshl/2015/RNASeq_Module2_Lecture.pptx
@@ -284,7 +284,7 @@
               <a:pPr>
                 <a:defRPr/>
               </a:pPr>
-              <a:t>11/14/15</a:t>
+              <a:t>11/16/15</a:t>
             </a:fld>
             <a:endParaRPr lang="en-US"/>
           </a:p>
@@ -491,7 +491,7 @@
               <a:pPr>
                 <a:defRPr/>
               </a:pPr>
-              <a:t>11/14/15</a:t>
+              <a:t>11/16/15</a:t>
             </a:fld>
             <a:endParaRPr lang="en-US"/>
           </a:p>
@@ -3394,7 +3394,7 @@
               <a:pPr>
                 <a:defRPr/>
               </a:pPr>
-              <a:t>11/14/15</a:t>
+              <a:t>11/16/15</a:t>
             </a:fld>
             <a:endParaRPr lang="en-US"/>
           </a:p>
@@ -16696,7 +16696,7 @@
           <a:lstStyle/>
           <a:p>
             <a:r>
-              <a:rPr lang="en-US">
+              <a:rPr lang="en-US" dirty="0">
                 <a:latin typeface="Calibri" charset="0"/>
                 <a:ea typeface="ＭＳ Ｐゴシック" charset="0"/>
               </a:rPr>
@@ -16750,7 +16750,11 @@
             </a:pPr>
             <a:r>
               <a:rPr lang="en-US" dirty="0" smtClean="0"/>
-              <a:t>11 bitwise flags describing the alignment</a:t>
+              <a:t>12 </a:t>
+            </a:r>
+            <a:r>
+              <a:rPr lang="en-US" dirty="0" smtClean="0"/>
+              <a:t>bitwise flags describing the alignment</a:t>
             </a:r>
           </a:p>
           <a:p>
@@ -16777,7 +16781,23 @@
             </a:pPr>
             <a:r>
               <a:rPr lang="en-US" dirty="0" smtClean="0"/>
-              <a:t>All combinations can be represented as a number from 0 to 2047 (i.e. 2</a:t>
+              <a:t>All combinations can be represented as a number from </a:t>
+            </a:r>
+            <a:r>
+              <a:rPr lang="en-US" dirty="0" smtClean="0"/>
+              <a:t>1 </a:t>
+            </a:r>
+            <a:r>
+              <a:rPr lang="en-US" dirty="0" smtClean="0"/>
+              <a:t>to </a:t>
+            </a:r>
+            <a:r>
+              <a:rPr lang="en-US" dirty="0" smtClean="0"/>
+              <a:t>2048 </a:t>
+            </a:r>
+            <a:r>
+              <a:rPr lang="en-US" dirty="0" smtClean="0"/>
+              <a:t>(i.e. 2</a:t>
             </a:r>
             <a:r>
               <a:rPr lang="en-US" baseline="30000" dirty="0" smtClean="0"/>
@@ -16791,60 +16811,6 @@
           </a:p>
         </p:txBody>
       </p:sp>
-      <p:pic>
-        <p:nvPicPr>
-          <p:cNvPr id="27651" name="Picture 3" descr="SAM-BAM FLAGs.png"/>
-          <p:cNvPicPr>
-            <a:picLocks noChangeAspect="1"/>
-          </p:cNvPicPr>
-          <p:nvPr/>
-        </p:nvPicPr>
-        <p:blipFill>
-          <a:blip r:embed="rId3">
-            <a:extLst>
-              <a:ext uri="{28A0092B-C50C-407E-A947-70E740481C1C}">
-                <a14:useLocalDpi xmlns:a14="http://schemas.microsoft.com/office/drawing/2010/main" val="0"/>
-              </a:ext>
-            </a:extLst>
-          </a:blip>
-          <a:srcRect/>
-          <a:stretch>
-            <a:fillRect/>
-          </a:stretch>
-        </p:blipFill>
-        <p:spPr bwMode="auto">
-          <a:xfrm>
-            <a:off x="900113" y="2635250"/>
-            <a:ext cx="6480175" cy="3190875"/>
-          </a:xfrm>
-          <a:prstGeom prst="rect">
-            <a:avLst/>
-          </a:prstGeom>
-          <a:noFill/>
-          <a:ln>
-            <a:noFill/>
-          </a:ln>
-          <a:extLst>
-            <a:ext uri="{909E8E84-426E-40dd-AFC4-6F175D3DCCD1}">
-              <a14:hiddenFill xmlns:a14="http://schemas.microsoft.com/office/drawing/2010/main">
-                <a:solidFill>
-                  <a:srgbClr val="FFFFFF"/>
-                </a:solidFill>
-              </a14:hiddenFill>
-            </a:ext>
-            <a:ext uri="{91240B29-F687-4f45-9708-019B960494DF}">
-              <a14:hiddenLine xmlns:a14="http://schemas.microsoft.com/office/drawing/2010/main" w="9525">
-                <a:solidFill>
-                  <a:srgbClr val="000000"/>
-                </a:solidFill>
-                <a:miter lim="800000"/>
-                <a:headEnd/>
-                <a:tailEnd/>
-              </a14:hiddenLine>
-            </a:ext>
-          </a:extLst>
-        </p:spPr>
-      </p:pic>
       <p:sp>
         <p:nvSpPr>
           <p:cNvPr id="27652" name="TextBox 4"/>
@@ -17006,6 +16972,36 @@
           </a:p>
         </p:txBody>
       </p:sp>
+      <p:pic>
+        <p:nvPicPr>
+          <p:cNvPr id="4" name="Picture 3" descr="Screen Shot 2015-11-16 at 1.15.52 PM.png"/>
+          <p:cNvPicPr>
+            <a:picLocks noChangeAspect="1"/>
+          </p:cNvPicPr>
+          <p:nvPr/>
+        </p:nvPicPr>
+        <p:blipFill>
+          <a:blip r:embed="rId3">
+            <a:extLst>
+              <a:ext uri="{28A0092B-C50C-407E-A947-70E740481C1C}">
+                <a14:useLocalDpi xmlns:a14="http://schemas.microsoft.com/office/drawing/2010/main" val="0"/>
+              </a:ext>
+            </a:extLst>
+          </a:blip>
+          <a:stretch>
+            <a:fillRect/>
+          </a:stretch>
+        </p:blipFill>
+        <p:spPr>
+          <a:xfrm>
+            <a:off x="467544" y="2636487"/>
+            <a:ext cx="7884368" cy="3168777"/>
+          </a:xfrm>
+          <a:prstGeom prst="rect">
+            <a:avLst/>
+          </a:prstGeom>
+        </p:spPr>
+      </p:pic>
     </p:spTree>
     <p:extLst>
       <p:ext uri="{BB962C8B-B14F-4D97-AF65-F5344CB8AC3E}">
@@ -29812,6 +29808,36 @@
           <a:chExt cx="0" cy="0"/>
         </a:xfrm>
       </p:grpSpPr>
+      <p:pic>
+        <p:nvPicPr>
+          <p:cNvPr id="4" name="Content Placeholder 3" descr="mappers_timeline.jpeg"/>
+          <p:cNvPicPr>
+            <a:picLocks noGrp="1" noChangeAspect="1"/>
+          </p:cNvPicPr>
+          <p:nvPr>
+            <p:ph idx="1"/>
+          </p:nvPr>
+        </p:nvPicPr>
+        <p:blipFill>
+          <a:blip r:embed="rId2">
+            <a:extLst>
+              <a:ext uri="{28A0092B-C50C-407E-A947-70E740481C1C}">
+                <a14:useLocalDpi xmlns:a14="http://schemas.microsoft.com/office/drawing/2010/main" val="0"/>
+              </a:ext>
+            </a:extLst>
+          </a:blip>
+          <a:srcRect l="-28165" r="-28165"/>
+          <a:stretch>
+            <a:fillRect/>
+          </a:stretch>
+        </p:blipFill>
+        <p:spPr>
+          <a:xfrm>
+            <a:off x="-756592" y="620688"/>
+            <a:ext cx="10040682" cy="5415880"/>
+          </a:xfrm>
+        </p:spPr>
+      </p:pic>
       <p:sp>
         <p:nvSpPr>
           <p:cNvPr id="18433" name="Title 1"/>
@@ -29842,36 +29868,6 @@
           </a:p>
         </p:txBody>
       </p:sp>
-      <p:pic>
-        <p:nvPicPr>
-          <p:cNvPr id="18434" name="Content Placeholder 5" descr="mappers_timeline.jpeg"/>
-          <p:cNvPicPr>
-            <a:picLocks noGrp="1" noChangeAspect="1"/>
-          </p:cNvPicPr>
-          <p:nvPr>
-            <p:ph idx="1"/>
-          </p:nvPr>
-        </p:nvPicPr>
-        <p:blipFill>
-          <a:blip r:embed="rId2">
-            <a:extLst>
-              <a:ext uri="{28A0092B-C50C-407E-A947-70E740481C1C}">
-                <a14:useLocalDpi xmlns:a14="http://schemas.microsoft.com/office/drawing/2010/main" val="0"/>
-              </a:ext>
-            </a:extLst>
-          </a:blip>
-          <a:srcRect l="10445" t="12167" r="5742" b="2191"/>
-          <a:stretch>
-            <a:fillRect/>
-          </a:stretch>
-        </p:blipFill>
-        <p:spPr>
-          <a:xfrm>
-            <a:off x="1763713" y="1196975"/>
-            <a:ext cx="5472112" cy="4718050"/>
-          </a:xfrm>
-        </p:spPr>
-      </p:pic>
       <p:sp>
         <p:nvSpPr>
           <p:cNvPr id="18435" name="TextBox 6"/>

</xml_diff>